<commit_message>
Health Information System Presentation
</commit_message>
<xml_diff>
--- a/Health Information System Presentation.pptx
+++ b/Health Information System Presentation.pptx
@@ -10,10 +10,9 @@
     <p:sldId id="258" r:id="rId4"/>
     <p:sldId id="259" r:id="rId5"/>
     <p:sldId id="260" r:id="rId6"/>
-    <p:sldId id="261" r:id="rId7"/>
-    <p:sldId id="262" r:id="rId8"/>
-    <p:sldId id="263" r:id="rId9"/>
-    <p:sldId id="264" r:id="rId10"/>
+    <p:sldId id="262" r:id="rId7"/>
+    <p:sldId id="263" r:id="rId8"/>
+    <p:sldId id="264" r:id="rId9"/>
   </p:sldIdLst>
   <p:sldSz cx="12192000" cy="6858000"/>
   <p:notesSz cx="6858000" cy="9144000"/>
@@ -4430,7 +4429,7 @@
           <p:cNvPr id="2" name="Title 1">
             <a:extLst>
               <a:ext uri="{FF2B5EF4-FFF2-40B4-BE49-F238E27FC236}">
-                <a16:creationId xmlns:a16="http://schemas.microsoft.com/office/drawing/2014/main" id="{F108AF63-E284-69EB-DFDD-2E923A3EFB24}"/>
+                <a16:creationId xmlns:a16="http://schemas.microsoft.com/office/drawing/2014/main" id="{FE8FE956-CE7D-C69D-D2E3-7E38EDAFF21D}"/>
               </a:ext>
             </a:extLst>
           </p:cNvPr>
@@ -4448,7 +4447,7 @@
           <a:p>
             <a:r>
               <a:rPr lang="en-US" b="1" dirty="0"/>
-              <a:t>API Demonstration</a:t>
+              <a:t>Challenges and Lessons Learned</a:t>
             </a:r>
           </a:p>
         </p:txBody>
@@ -4458,7 +4457,7 @@
           <p:cNvPr id="4" name="Rectangle 1">
             <a:extLst>
               <a:ext uri="{FF2B5EF4-FFF2-40B4-BE49-F238E27FC236}">
-                <a16:creationId xmlns:a16="http://schemas.microsoft.com/office/drawing/2014/main" id="{C778B882-A131-4831-8CA9-1B436F811E9C}"/>
+                <a16:creationId xmlns:a16="http://schemas.microsoft.com/office/drawing/2014/main" id="{971E7A36-12AA-06F7-AB44-E8C7D7993066}"/>
               </a:ext>
             </a:extLst>
           </p:cNvPr>
@@ -4543,69 +4542,8 @@
                 <a:effectLst/>
                 <a:latin typeface="Arial" panose="020B0604020202020204" pitchFamily="34" charset="0"/>
               </a:rPr>
-              <a:t>Insert a </a:t>
-            </a:r>
-            <a:r>
-              <a:rPr kumimoji="0" lang="en-US" altLang="en-US" sz="1800" b="1" i="0" u="none" strike="noStrike" cap="none" normalizeH="0" baseline="0">
-                <a:ln>
-                  <a:noFill/>
-                </a:ln>
-                <a:solidFill>
-                  <a:schemeClr val="tx1"/>
-                </a:solidFill>
-                <a:effectLst/>
-                <a:latin typeface="Arial" panose="020B0604020202020204" pitchFamily="34" charset="0"/>
-              </a:rPr>
-              <a:t>screenshot of your deployed app</a:t>
-            </a:r>
-            <a:r>
-              <a:rPr kumimoji="0" lang="en-US" altLang="en-US" sz="1800" b="0" i="0" u="none" strike="noStrike" cap="none" normalizeH="0" baseline="0">
-                <a:ln>
-                  <a:noFill/>
-                </a:ln>
-                <a:solidFill>
-                  <a:schemeClr val="tx1"/>
-                </a:solidFill>
-                <a:effectLst/>
-                <a:latin typeface="Arial" panose="020B0604020202020204" pitchFamily="34" charset="0"/>
-              </a:rPr>
-              <a:t> showing </a:t>
-            </a:r>
-            <a:r>
-              <a:rPr kumimoji="0" lang="en-US" altLang="en-US" sz="1000" b="0" i="0" u="none" strike="noStrike" cap="none" normalizeH="0" baseline="0">
-                <a:ln>
-                  <a:noFill/>
-                </a:ln>
-                <a:solidFill>
-                  <a:schemeClr val="tx1"/>
-                </a:solidFill>
-                <a:effectLst/>
-                <a:latin typeface="Arial Unicode MS"/>
-              </a:rPr>
-              <a:t>/docs</a:t>
-            </a:r>
-            <a:r>
-              <a:rPr kumimoji="0" lang="en-US" altLang="en-US" sz="1100" b="0" i="0" u="none" strike="noStrike" cap="none" normalizeH="0" baseline="0">
-                <a:ln>
-                  <a:noFill/>
-                </a:ln>
-                <a:solidFill>
-                  <a:schemeClr val="tx1"/>
-                </a:solidFill>
-                <a:effectLst/>
-              </a:rPr>
-              <a:t>.</a:t>
-            </a:r>
-            <a:endParaRPr kumimoji="0" lang="en-US" altLang="en-US" sz="1800" b="0" i="0" u="none" strike="noStrike" cap="none" normalizeH="0" baseline="0">
-              <a:ln>
-                <a:noFill/>
-              </a:ln>
-              <a:solidFill>
-                <a:schemeClr val="tx1"/>
-              </a:solidFill>
-              <a:effectLst/>
-              <a:latin typeface="Arial" panose="020B0604020202020204" pitchFamily="34" charset="0"/>
-            </a:endParaRPr>
+              <a:t>Handling many-to-many relationships in database design.</a:t>
+            </a:r>
           </a:p>
           <a:p>
             <a:pPr marL="0" marR="0" lvl="0" indent="0" algn="l" defTabSz="914400" rtl="0" eaLnBrk="0" fontAlgn="base" latinLnBrk="0" hangingPunct="0">
@@ -4635,7 +4573,7 @@
                 <a:effectLst/>
                 <a:latin typeface="Arial" panose="020B0604020202020204" pitchFamily="34" charset="0"/>
               </a:rPr>
-              <a:t>Or show examples like:</a:t>
+              <a:t>Managing API routes cleanly.</a:t>
             </a:r>
           </a:p>
           <a:p>
@@ -4666,7 +4604,7 @@
                 <a:effectLst/>
                 <a:latin typeface="Arial" panose="020B0604020202020204" pitchFamily="34" charset="0"/>
               </a:rPr>
-              <a:t>Create Program</a:t>
+              <a:t>Understanding deployment configurations (Render setup).</a:t>
             </a:r>
           </a:p>
           <a:p>
@@ -4697,105 +4635,15 @@
                 <a:effectLst/>
                 <a:latin typeface="Arial" panose="020B0604020202020204" pitchFamily="34" charset="0"/>
               </a:rPr>
-              <a:t>Register Client</a:t>
-            </a:r>
-          </a:p>
-          <a:p>
-            <a:pPr marL="0" marR="0" lvl="0" indent="0" algn="l" defTabSz="914400" rtl="0" eaLnBrk="0" fontAlgn="base" latinLnBrk="0" hangingPunct="0">
-              <a:lnSpc>
-                <a:spcPct val="100000"/>
-              </a:lnSpc>
-              <a:spcBef>
-                <a:spcPct val="0"/>
-              </a:spcBef>
-              <a:spcAft>
-                <a:spcPct val="0"/>
-              </a:spcAft>
-              <a:buClrTx/>
-              <a:buSzTx/>
-              <a:buFontTx/>
-              <a:buChar char="•"/>
-              <a:tabLst/>
-            </a:pPr>
-            <a:r>
-              <a:rPr kumimoji="0" lang="en-US" altLang="en-US" sz="1800" b="0" i="0" u="none" strike="noStrike" cap="none" normalizeH="0" baseline="0">
-                <a:ln>
-                  <a:noFill/>
-                </a:ln>
-                <a:solidFill>
-                  <a:schemeClr val="tx1"/>
-                </a:solidFill>
-                <a:effectLst/>
-                <a:latin typeface="Arial" panose="020B0604020202020204" pitchFamily="34" charset="0"/>
-              </a:rPr>
-              <a:t>Enroll Client</a:t>
-            </a:r>
-          </a:p>
-          <a:p>
-            <a:pPr marL="0" marR="0" lvl="0" indent="0" algn="l" defTabSz="914400" rtl="0" eaLnBrk="0" fontAlgn="base" latinLnBrk="0" hangingPunct="0">
-              <a:lnSpc>
-                <a:spcPct val="100000"/>
-              </a:lnSpc>
-              <a:spcBef>
-                <a:spcPct val="0"/>
-              </a:spcBef>
-              <a:spcAft>
-                <a:spcPct val="0"/>
-              </a:spcAft>
-              <a:buClrTx/>
-              <a:buSzTx/>
-              <a:buFontTx/>
-              <a:buChar char="•"/>
-              <a:tabLst/>
-            </a:pPr>
-            <a:r>
-              <a:rPr kumimoji="0" lang="en-US" altLang="en-US" sz="1800" b="0" i="0" u="none" strike="noStrike" cap="none" normalizeH="0" baseline="0">
-                <a:ln>
-                  <a:noFill/>
-                </a:ln>
-                <a:solidFill>
-                  <a:schemeClr val="tx1"/>
-                </a:solidFill>
-                <a:effectLst/>
-                <a:latin typeface="Arial" panose="020B0604020202020204" pitchFamily="34" charset="0"/>
-              </a:rPr>
-              <a:t>Get Client Profile</a:t>
-            </a:r>
-          </a:p>
-          <a:p>
-            <a:pPr marL="0" marR="0" lvl="0" indent="0" algn="l" defTabSz="914400" rtl="0" eaLnBrk="0" fontAlgn="base" latinLnBrk="0" hangingPunct="0">
-              <a:lnSpc>
-                <a:spcPct val="100000"/>
-              </a:lnSpc>
-              <a:spcBef>
-                <a:spcPct val="0"/>
-              </a:spcBef>
-              <a:spcAft>
-                <a:spcPct val="0"/>
-              </a:spcAft>
-              <a:buClrTx/>
-              <a:buSzTx/>
-              <a:buFontTx/>
-              <a:buNone/>
-              <a:tabLst/>
-            </a:pPr>
-            <a:endParaRPr kumimoji="0" lang="en-US" altLang="en-US" sz="1800" b="0" i="0" u="none" strike="noStrike" cap="none" normalizeH="0" baseline="0">
-              <a:ln>
-                <a:noFill/>
-              </a:ln>
-              <a:solidFill>
-                <a:schemeClr val="tx1"/>
-              </a:solidFill>
-              <a:effectLst/>
-              <a:latin typeface="Arial" panose="020B0604020202020204" pitchFamily="34" charset="0"/>
-            </a:endParaRPr>
+              <a:t>Importance of clean commit history.</a:t>
+            </a:r>
           </a:p>
         </p:txBody>
       </p:sp>
     </p:spTree>
     <p:extLst>
       <p:ext uri="{BB962C8B-B14F-4D97-AF65-F5344CB8AC3E}">
-        <p14:creationId xmlns:p14="http://schemas.microsoft.com/office/powerpoint/2010/main" val="275926765"/>
+        <p14:creationId xmlns:p14="http://schemas.microsoft.com/office/powerpoint/2010/main" val="522721521"/>
       </p:ext>
     </p:extLst>
   </p:cSld>
@@ -4827,252 +4675,6 @@
           <p:cNvPr id="2" name="Title 1">
             <a:extLst>
               <a:ext uri="{FF2B5EF4-FFF2-40B4-BE49-F238E27FC236}">
-                <a16:creationId xmlns:a16="http://schemas.microsoft.com/office/drawing/2014/main" id="{FE8FE956-CE7D-C69D-D2E3-7E38EDAFF21D}"/>
-              </a:ext>
-            </a:extLst>
-          </p:cNvPr>
-          <p:cNvSpPr>
-            <a:spLocks noGrp="1"/>
-          </p:cNvSpPr>
-          <p:nvPr>
-            <p:ph type="title"/>
-          </p:nvPr>
-        </p:nvSpPr>
-        <p:spPr/>
-        <p:txBody>
-          <a:bodyPr/>
-          <a:lstStyle/>
-          <a:p>
-            <a:r>
-              <a:rPr lang="en-US" b="1" dirty="0"/>
-              <a:t>Challenges and Lessons Learned</a:t>
-            </a:r>
-          </a:p>
-        </p:txBody>
-      </p:sp>
-      <p:sp>
-        <p:nvSpPr>
-          <p:cNvPr id="4" name="Rectangle 1">
-            <a:extLst>
-              <a:ext uri="{FF2B5EF4-FFF2-40B4-BE49-F238E27FC236}">
-                <a16:creationId xmlns:a16="http://schemas.microsoft.com/office/drawing/2014/main" id="{971E7A36-12AA-06F7-AB44-E8C7D7993066}"/>
-              </a:ext>
-            </a:extLst>
-          </p:cNvPr>
-          <p:cNvSpPr>
-            <a:spLocks noGrp="1" noChangeArrowheads="1"/>
-          </p:cNvSpPr>
-          <p:nvPr>
-            <p:ph idx="1"/>
-          </p:nvPr>
-        </p:nvSpPr>
-        <p:spPr bwMode="auto">
-          <a:prstGeom prst="rect">
-            <a:avLst/>
-          </a:prstGeom>
-          <a:noFill/>
-          <a:ln>
-            <a:noFill/>
-          </a:ln>
-          <a:effectLst/>
-          <a:extLst>
-            <a:ext uri="{909E8E84-426E-40DD-AFC4-6F175D3DCCD1}">
-              <a14:hiddenFill xmlns:a14="http://schemas.microsoft.com/office/drawing/2010/main">
-                <a:solidFill>
-                  <a:schemeClr val="accent1"/>
-                </a:solidFill>
-              </a14:hiddenFill>
-            </a:ext>
-            <a:ext uri="{91240B29-F687-4F45-9708-019B960494DF}">
-              <a14:hiddenLine xmlns:a14="http://schemas.microsoft.com/office/drawing/2010/main" w="9525">
-                <a:solidFill>
-                  <a:schemeClr val="tx1"/>
-                </a:solidFill>
-                <a:miter lim="800000"/>
-                <a:headEnd/>
-                <a:tailEnd/>
-              </a14:hiddenLine>
-            </a:ext>
-            <a:ext uri="{AF507438-7753-43E0-B8FC-AC1667EBCBE1}">
-              <a14:hiddenEffects xmlns:a14="http://schemas.microsoft.com/office/drawing/2010/main">
-                <a:effectLst>
-                  <a:outerShdw dist="35921" dir="2700000" algn="ctr" rotWithShape="0">
-                    <a:schemeClr val="bg2"/>
-                  </a:outerShdw>
-                </a:effectLst>
-              </a14:hiddenEffects>
-            </a:ext>
-          </a:extLst>
-        </p:spPr>
-        <p:txBody>
-          <a:bodyPr vert="horz" wrap="none" lIns="91440" tIns="45720" rIns="91440" bIns="45720" numCol="1" anchor="ctr" anchorCtr="0" compatLnSpc="1">
-            <a:prstTxWarp prst="textNoShape">
-              <a:avLst/>
-            </a:prstTxWarp>
-            <a:spAutoFit/>
-          </a:bodyPr>
-          <a:lstStyle/>
-          <a:p>
-            <a:pPr marL="0" marR="0" lvl="0" indent="0" algn="l" defTabSz="914400" rtl="0" eaLnBrk="0" fontAlgn="base" latinLnBrk="0" hangingPunct="0">
-              <a:lnSpc>
-                <a:spcPct val="100000"/>
-              </a:lnSpc>
-              <a:spcBef>
-                <a:spcPct val="0"/>
-              </a:spcBef>
-              <a:spcAft>
-                <a:spcPct val="0"/>
-              </a:spcAft>
-              <a:buClrTx/>
-              <a:buSzTx/>
-              <a:buFontTx/>
-              <a:buChar char="•"/>
-              <a:tabLst/>
-            </a:pPr>
-            <a:r>
-              <a:rPr kumimoji="0" lang="en-US" altLang="en-US" sz="1800" b="0" i="0" u="none" strike="noStrike" cap="none" normalizeH="0" baseline="0">
-                <a:ln>
-                  <a:noFill/>
-                </a:ln>
-                <a:solidFill>
-                  <a:schemeClr val="tx1"/>
-                </a:solidFill>
-                <a:effectLst/>
-                <a:latin typeface="Arial" panose="020B0604020202020204" pitchFamily="34" charset="0"/>
-              </a:rPr>
-              <a:t>Handling many-to-many relationships in database design.</a:t>
-            </a:r>
-          </a:p>
-          <a:p>
-            <a:pPr marL="0" marR="0" lvl="0" indent="0" algn="l" defTabSz="914400" rtl="0" eaLnBrk="0" fontAlgn="base" latinLnBrk="0" hangingPunct="0">
-              <a:lnSpc>
-                <a:spcPct val="100000"/>
-              </a:lnSpc>
-              <a:spcBef>
-                <a:spcPct val="0"/>
-              </a:spcBef>
-              <a:spcAft>
-                <a:spcPct val="0"/>
-              </a:spcAft>
-              <a:buClrTx/>
-              <a:buSzTx/>
-              <a:buFontTx/>
-              <a:buChar char="•"/>
-              <a:tabLst/>
-            </a:pPr>
-            <a:r>
-              <a:rPr kumimoji="0" lang="en-US" altLang="en-US" sz="1800" b="0" i="0" u="none" strike="noStrike" cap="none" normalizeH="0" baseline="0">
-                <a:ln>
-                  <a:noFill/>
-                </a:ln>
-                <a:solidFill>
-                  <a:schemeClr val="tx1"/>
-                </a:solidFill>
-                <a:effectLst/>
-                <a:latin typeface="Arial" panose="020B0604020202020204" pitchFamily="34" charset="0"/>
-              </a:rPr>
-              <a:t>Managing API routes cleanly.</a:t>
-            </a:r>
-          </a:p>
-          <a:p>
-            <a:pPr marL="0" marR="0" lvl="0" indent="0" algn="l" defTabSz="914400" rtl="0" eaLnBrk="0" fontAlgn="base" latinLnBrk="0" hangingPunct="0">
-              <a:lnSpc>
-                <a:spcPct val="100000"/>
-              </a:lnSpc>
-              <a:spcBef>
-                <a:spcPct val="0"/>
-              </a:spcBef>
-              <a:spcAft>
-                <a:spcPct val="0"/>
-              </a:spcAft>
-              <a:buClrTx/>
-              <a:buSzTx/>
-              <a:buFontTx/>
-              <a:buChar char="•"/>
-              <a:tabLst/>
-            </a:pPr>
-            <a:r>
-              <a:rPr kumimoji="0" lang="en-US" altLang="en-US" sz="1800" b="0" i="0" u="none" strike="noStrike" cap="none" normalizeH="0" baseline="0">
-                <a:ln>
-                  <a:noFill/>
-                </a:ln>
-                <a:solidFill>
-                  <a:schemeClr val="tx1"/>
-                </a:solidFill>
-                <a:effectLst/>
-                <a:latin typeface="Arial" panose="020B0604020202020204" pitchFamily="34" charset="0"/>
-              </a:rPr>
-              <a:t>Understanding deployment configurations (Render setup).</a:t>
-            </a:r>
-          </a:p>
-          <a:p>
-            <a:pPr marL="0" marR="0" lvl="0" indent="0" algn="l" defTabSz="914400" rtl="0" eaLnBrk="0" fontAlgn="base" latinLnBrk="0" hangingPunct="0">
-              <a:lnSpc>
-                <a:spcPct val="100000"/>
-              </a:lnSpc>
-              <a:spcBef>
-                <a:spcPct val="0"/>
-              </a:spcBef>
-              <a:spcAft>
-                <a:spcPct val="0"/>
-              </a:spcAft>
-              <a:buClrTx/>
-              <a:buSzTx/>
-              <a:buFontTx/>
-              <a:buChar char="•"/>
-              <a:tabLst/>
-            </a:pPr>
-            <a:r>
-              <a:rPr kumimoji="0" lang="en-US" altLang="en-US" sz="1800" b="0" i="0" u="none" strike="noStrike" cap="none" normalizeH="0" baseline="0">
-                <a:ln>
-                  <a:noFill/>
-                </a:ln>
-                <a:solidFill>
-                  <a:schemeClr val="tx1"/>
-                </a:solidFill>
-                <a:effectLst/>
-                <a:latin typeface="Arial" panose="020B0604020202020204" pitchFamily="34" charset="0"/>
-              </a:rPr>
-              <a:t>Importance of clean commit history.</a:t>
-            </a:r>
-          </a:p>
-        </p:txBody>
-      </p:sp>
-    </p:spTree>
-    <p:extLst>
-      <p:ext uri="{BB962C8B-B14F-4D97-AF65-F5344CB8AC3E}">
-        <p14:creationId xmlns:p14="http://schemas.microsoft.com/office/powerpoint/2010/main" val="522721521"/>
-      </p:ext>
-    </p:extLst>
-  </p:cSld>
-  <p:clrMapOvr>
-    <a:masterClrMapping/>
-  </p:clrMapOvr>
-</p:sld>
-</file>
-
-<file path=ppt/slides/slide8.xml><?xml version="1.0" encoding="utf-8"?>
-<p:sld xmlns:a="http://schemas.openxmlformats.org/drawingml/2006/main" xmlns:r="http://schemas.openxmlformats.org/officeDocument/2006/relationships" xmlns:p="http://schemas.openxmlformats.org/presentationml/2006/main">
-  <p:cSld>
-    <p:spTree>
-      <p:nvGrpSpPr>
-        <p:cNvPr id="1" name=""/>
-        <p:cNvGrpSpPr/>
-        <p:nvPr/>
-      </p:nvGrpSpPr>
-      <p:grpSpPr>
-        <a:xfrm>
-          <a:off x="0" y="0"/>
-          <a:ext cx="0" cy="0"/>
-          <a:chOff x="0" y="0"/>
-          <a:chExt cx="0" cy="0"/>
-        </a:xfrm>
-      </p:grpSpPr>
-      <p:sp>
-        <p:nvSpPr>
-          <p:cNvPr id="2" name="Title 1">
-            <a:extLst>
-              <a:ext uri="{FF2B5EF4-FFF2-40B4-BE49-F238E27FC236}">
                 <a16:creationId xmlns:a16="http://schemas.microsoft.com/office/drawing/2014/main" id="{E30097E7-388B-E180-3EBE-70AF8F156AF5}"/>
               </a:ext>
             </a:extLst>
@@ -5129,28 +4731,9 @@
               <a:rPr lang="en-US" dirty="0"/>
             </a:br>
             <a:r>
-              <a:rPr lang="en-US" dirty="0"/>
-              <a:t>👉 https://ron-kiplimo.onrender.com</a:t>
-            </a:r>
-          </a:p>
-          <a:p>
-            <a:pPr>
-              <a:buFont typeface="Arial" panose="020B0604020202020204" pitchFamily="34" charset="0"/>
-              <a:buChar char="•"/>
-            </a:pPr>
-            <a:r>
-              <a:rPr lang="en-US" dirty="0"/>
-              <a:t>API Docs:</a:t>
-            </a:r>
-            <a:br>
-              <a:rPr lang="en-US" dirty="0"/>
-            </a:br>
-            <a:r>
-              <a:rPr lang="en-US" dirty="0"/>
-              <a:t>👉 https://ron-kiplimo.onrender.com/docs</a:t>
-            </a:r>
-          </a:p>
-          <a:p>
+              <a:rPr lang="en-US"/>
+              <a:t>👉 https://dashboard.render.com/web/srv-d06cllhr0fns73fg2q9g</a:t>
+            </a:r>
             <a:endParaRPr lang="en-US" dirty="0"/>
           </a:p>
         </p:txBody>
@@ -5168,7 +4751,7 @@
 </p:sld>
 </file>
 
-<file path=ppt/slides/slide9.xml><?xml version="1.0" encoding="utf-8"?>
+<file path=ppt/slides/slide8.xml><?xml version="1.0" encoding="utf-8"?>
 <p:sld xmlns:a="http://schemas.openxmlformats.org/drawingml/2006/main" xmlns:r="http://schemas.openxmlformats.org/officeDocument/2006/relationships" xmlns:p="http://schemas.openxmlformats.org/presentationml/2006/main">
   <p:cSld>
     <p:spTree>

</xml_diff>